<commit_message>
add ilab coding bootcamp pub
</commit_message>
<xml_diff>
--- a/presentation.pptx
+++ b/presentation.pptx
@@ -15,6 +15,7 @@
     <p:sldId id="262" r:id="rId9"/>
     <p:sldId id="263" r:id="rId10"/>
     <p:sldId id="264" r:id="rId11"/>
+    <p:sldId id="266" r:id="rId12"/>
   </p:sldIdLst>
   <p:sldSz cx="9144000" cy="6858000" type="screen4x3"/>
   <p:notesSz cx="6858000" cy="9144000"/>
@@ -6550,6 +6551,151 @@
 </p:sld>
 </file>
 
+<file path=ppt/slides/slide11.xml><?xml version="1.0" encoding="utf-8"?>
+<p:sld xmlns:a="http://schemas.openxmlformats.org/drawingml/2006/main" xmlns:r="http://schemas.openxmlformats.org/officeDocument/2006/relationships" xmlns:mc="http://schemas.openxmlformats.org/markup-compatibility/2006" xmlns:mv="urn:schemas-microsoft-com:mac:vml" xmlns:p="http://schemas.openxmlformats.org/presentationml/2006/main" mc:Ignorable="mv" mc:PreserveAttributes="mv:*">
+  <p:cSld>
+    <p:spTree>
+      <p:nvGrpSpPr>
+        <p:cNvPr id="1" name=""/>
+        <p:cNvGrpSpPr/>
+        <p:nvPr/>
+      </p:nvGrpSpPr>
+      <p:grpSpPr>
+        <a:xfrm>
+          <a:off x="0" y="0"/>
+          <a:ext cx="0" cy="0"/>
+          <a:chOff x="0" y="0"/>
+          <a:chExt cx="0" cy="0"/>
+        </a:xfrm>
+      </p:grpSpPr>
+      <p:sp>
+        <p:nvSpPr>
+          <p:cNvPr id="2" name="Title 1"/>
+          <p:cNvSpPr>
+            <a:spLocks noGrp="1"/>
+          </p:cNvSpPr>
+          <p:nvPr>
+            <p:ph type="title"/>
+          </p:nvPr>
+        </p:nvSpPr>
+        <p:spPr/>
+        <p:txBody>
+          <a:bodyPr/>
+          <a:lstStyle/>
+          <a:p>
+            <a:r>
+              <a:rPr lang="en-US" dirty="0" err="1" smtClean="0"/>
+              <a:t>iLab</a:t>
+            </a:r>
+            <a:r>
+              <a:rPr lang="en-US" dirty="0" smtClean="0"/>
+              <a:t> Coding </a:t>
+            </a:r>
+            <a:r>
+              <a:rPr lang="en-US" dirty="0" err="1" smtClean="0"/>
+              <a:t>Bootcamp</a:t>
+            </a:r>
+            <a:endParaRPr lang="en-US" dirty="0"/>
+          </a:p>
+        </p:txBody>
+      </p:sp>
+      <p:sp>
+        <p:nvSpPr>
+          <p:cNvPr id="3" name="Content Placeholder 2"/>
+          <p:cNvSpPr>
+            <a:spLocks noGrp="1"/>
+          </p:cNvSpPr>
+          <p:nvPr>
+            <p:ph idx="1"/>
+          </p:nvPr>
+        </p:nvSpPr>
+        <p:spPr/>
+        <p:txBody>
+          <a:bodyPr>
+            <a:normAutofit/>
+          </a:bodyPr>
+          <a:lstStyle/>
+          <a:p>
+            <a:r>
+              <a:rPr lang="en-US" dirty="0" smtClean="0"/>
+              <a:t>There will be a free </a:t>
+            </a:r>
+            <a:r>
+              <a:rPr lang="en-US" dirty="0" smtClean="0"/>
+              <a:t>Coding </a:t>
+            </a:r>
+            <a:r>
+              <a:rPr lang="en-US" dirty="0" err="1" smtClean="0"/>
+              <a:t>Bootcamp</a:t>
+            </a:r>
+            <a:r>
+              <a:rPr lang="en-US" dirty="0" smtClean="0"/>
+              <a:t> at the </a:t>
+            </a:r>
+            <a:r>
+              <a:rPr lang="en-US" dirty="0" err="1" smtClean="0"/>
+              <a:t>i</a:t>
+            </a:r>
+            <a:r>
+              <a:rPr lang="en-US" dirty="0" smtClean="0"/>
+              <a:t>-lab, the weekend of April 20-21, for anyone who wants to learn Python. It will be a Learn by Doing workshop where we build out a responsive HTML5 Web App with Python, </a:t>
+            </a:r>
+            <a:r>
+              <a:rPr lang="en-US" dirty="0" err="1" smtClean="0"/>
+              <a:t>MongoDB</a:t>
+            </a:r>
+            <a:r>
+              <a:rPr lang="en-US" dirty="0" smtClean="0"/>
+              <a:t> and </a:t>
+            </a:r>
+            <a:r>
+              <a:rPr lang="en-US" dirty="0" err="1" smtClean="0"/>
+              <a:t>AngularJS</a:t>
+            </a:r>
+            <a:r>
+              <a:rPr lang="en-US" dirty="0" smtClean="0"/>
+              <a:t>. No prior experience with any of these technologies are required! As long as you understand basic programming concepts like variables &amp; functions,</a:t>
+            </a:r>
+            <a:r>
+              <a:rPr lang="en-US" dirty="0" smtClean="0"/>
+              <a:t> they'll </a:t>
+            </a:r>
+            <a:r>
+              <a:rPr lang="en-US" dirty="0" smtClean="0"/>
+              <a:t>teach you everything you need to know about Python, JavaScript &amp; </a:t>
+            </a:r>
+            <a:r>
+              <a:rPr lang="en-US" dirty="0" err="1" smtClean="0"/>
+              <a:t>MongoDB</a:t>
+            </a:r>
+            <a:r>
+              <a:rPr lang="en-US" dirty="0" smtClean="0"/>
+              <a:t> to build the app.</a:t>
+            </a:r>
+            <a:r>
+              <a:rPr lang="en-US" dirty="0" smtClean="0"/>
+              <a:t> </a:t>
+            </a:r>
+          </a:p>
+          <a:p>
+            <a:r>
+              <a:rPr lang="en-US" dirty="0" smtClean="0"/>
+              <a:t>Learn more and register here: http://www.eventbrite.com/event/6109685233</a:t>
+            </a:r>
+          </a:p>
+          <a:p>
+            <a:endParaRPr lang="en-US" dirty="0"/>
+          </a:p>
+        </p:txBody>
+      </p:sp>
+    </p:spTree>
+  </p:cSld>
+  <p:clrMapOvr>
+    <a:masterClrMapping/>
+  </p:clrMapOvr>
+</p:sld>
+</file>
+
 <file path=ppt/slides/slide2.xml><?xml version="1.0" encoding="utf-8"?>
 <p:sld xmlns:a="http://schemas.openxmlformats.org/drawingml/2006/main" xmlns:r="http://schemas.openxmlformats.org/officeDocument/2006/relationships" xmlns:mc="http://schemas.openxmlformats.org/markup-compatibility/2006" xmlns:mv="urn:schemas-microsoft-com:mac:vml" xmlns:p="http://schemas.openxmlformats.org/presentationml/2006/main" mc:Ignorable="mv" mc:PreserveAttributes="mv:*">
   <p:cSld>
@@ -6685,10 +6831,10 @@
               <a:t>www.getcollc.com</a:t>
             </a:r>
             <a:r>
-              <a:rPr lang="en-US" smtClean="0"/>
+              <a:rPr lang="en-US" dirty="0" smtClean="0"/>
               <a:t>/</a:t>
             </a:r>
-            <a:endParaRPr lang="en-US"/>
+            <a:endParaRPr lang="en-US" dirty="0"/>
           </a:p>
         </p:txBody>
       </p:sp>

</xml_diff>